<commit_message>
Added MATLAB vs Fluent Comparison slide
</commit_message>
<xml_diff>
--- a/Hemodynamic Calculations.pptx
+++ b/Hemodynamic Calculations.pptx
@@ -15,6 +15,7 @@
     <p:sldId id="269" r:id="rId9"/>
     <p:sldId id="272" r:id="rId10"/>
     <p:sldId id="266" r:id="rId11"/>
+    <p:sldId id="273" r:id="rId12"/>
   </p:sldIdLst>
   <p:sldSz cx="12192000" cy="6858000"/>
   <p:notesSz cx="6858000" cy="9144000"/>
@@ -268,7 +269,7 @@
           <a:p>
             <a:fld id="{2204EAE1-AF08-42D8-BDB4-DE1748E02D8D}" type="datetimeFigureOut">
               <a:rPr lang="en-US" smtClean="0"/>
-              <a:t>4/10/2021</a:t>
+              <a:t>4/11/2021</a:t>
             </a:fld>
             <a:endParaRPr lang="en-US"/>
           </a:p>
@@ -466,7 +467,7 @@
           <a:p>
             <a:fld id="{2204EAE1-AF08-42D8-BDB4-DE1748E02D8D}" type="datetimeFigureOut">
               <a:rPr lang="en-US" smtClean="0"/>
-              <a:t>4/10/2021</a:t>
+              <a:t>4/11/2021</a:t>
             </a:fld>
             <a:endParaRPr lang="en-US"/>
           </a:p>
@@ -674,7 +675,7 @@
           <a:p>
             <a:fld id="{2204EAE1-AF08-42D8-BDB4-DE1748E02D8D}" type="datetimeFigureOut">
               <a:rPr lang="en-US" smtClean="0"/>
-              <a:t>4/10/2021</a:t>
+              <a:t>4/11/2021</a:t>
             </a:fld>
             <a:endParaRPr lang="en-US"/>
           </a:p>
@@ -872,7 +873,7 @@
           <a:p>
             <a:fld id="{2204EAE1-AF08-42D8-BDB4-DE1748E02D8D}" type="datetimeFigureOut">
               <a:rPr lang="en-US" smtClean="0"/>
-              <a:t>4/10/2021</a:t>
+              <a:t>4/11/2021</a:t>
             </a:fld>
             <a:endParaRPr lang="en-US"/>
           </a:p>
@@ -1147,7 +1148,7 @@
           <a:p>
             <a:fld id="{2204EAE1-AF08-42D8-BDB4-DE1748E02D8D}" type="datetimeFigureOut">
               <a:rPr lang="en-US" smtClean="0"/>
-              <a:t>4/10/2021</a:t>
+              <a:t>4/11/2021</a:t>
             </a:fld>
             <a:endParaRPr lang="en-US"/>
           </a:p>
@@ -1412,7 +1413,7 @@
           <a:p>
             <a:fld id="{2204EAE1-AF08-42D8-BDB4-DE1748E02D8D}" type="datetimeFigureOut">
               <a:rPr lang="en-US" smtClean="0"/>
-              <a:t>4/10/2021</a:t>
+              <a:t>4/11/2021</a:t>
             </a:fld>
             <a:endParaRPr lang="en-US"/>
           </a:p>
@@ -1824,7 +1825,7 @@
           <a:p>
             <a:fld id="{2204EAE1-AF08-42D8-BDB4-DE1748E02D8D}" type="datetimeFigureOut">
               <a:rPr lang="en-US" smtClean="0"/>
-              <a:t>4/10/2021</a:t>
+              <a:t>4/11/2021</a:t>
             </a:fld>
             <a:endParaRPr lang="en-US"/>
           </a:p>
@@ -1965,7 +1966,7 @@
           <a:p>
             <a:fld id="{2204EAE1-AF08-42D8-BDB4-DE1748E02D8D}" type="datetimeFigureOut">
               <a:rPr lang="en-US" smtClean="0"/>
-              <a:t>4/10/2021</a:t>
+              <a:t>4/11/2021</a:t>
             </a:fld>
             <a:endParaRPr lang="en-US"/>
           </a:p>
@@ -2078,7 +2079,7 @@
           <a:p>
             <a:fld id="{2204EAE1-AF08-42D8-BDB4-DE1748E02D8D}" type="datetimeFigureOut">
               <a:rPr lang="en-US" smtClean="0"/>
-              <a:t>4/10/2021</a:t>
+              <a:t>4/11/2021</a:t>
             </a:fld>
             <a:endParaRPr lang="en-US"/>
           </a:p>
@@ -2389,7 +2390,7 @@
           <a:p>
             <a:fld id="{2204EAE1-AF08-42D8-BDB4-DE1748E02D8D}" type="datetimeFigureOut">
               <a:rPr lang="en-US" smtClean="0"/>
-              <a:t>4/10/2021</a:t>
+              <a:t>4/11/2021</a:t>
             </a:fld>
             <a:endParaRPr lang="en-US"/>
           </a:p>
@@ -2677,7 +2678,7 @@
           <a:p>
             <a:fld id="{2204EAE1-AF08-42D8-BDB4-DE1748E02D8D}" type="datetimeFigureOut">
               <a:rPr lang="en-US" smtClean="0"/>
-              <a:t>4/10/2021</a:t>
+              <a:t>4/11/2021</a:t>
             </a:fld>
             <a:endParaRPr lang="en-US"/>
           </a:p>
@@ -2918,7 +2919,7 @@
           <a:p>
             <a:fld id="{2204EAE1-AF08-42D8-BDB4-DE1748E02D8D}" type="datetimeFigureOut">
               <a:rPr lang="en-US" smtClean="0"/>
-              <a:t>4/10/2021</a:t>
+              <a:t>4/11/2021</a:t>
             </a:fld>
             <a:endParaRPr lang="en-US"/>
           </a:p>
@@ -3751,6 +3752,240 @@
 </p:sld>
 </file>
 
+<file path=ppt/slides/slide11.xml><?xml version="1.0" encoding="utf-8"?>
+<p:sld xmlns:a="http://schemas.openxmlformats.org/drawingml/2006/main" xmlns:r="http://schemas.openxmlformats.org/officeDocument/2006/relationships" xmlns:p="http://schemas.openxmlformats.org/presentationml/2006/main">
+  <p:cSld>
+    <p:spTree>
+      <p:nvGrpSpPr>
+        <p:cNvPr id="1" name=""/>
+        <p:cNvGrpSpPr/>
+        <p:nvPr/>
+      </p:nvGrpSpPr>
+      <p:grpSpPr>
+        <a:xfrm>
+          <a:off x="0" y="0"/>
+          <a:ext cx="0" cy="0"/>
+          <a:chOff x="0" y="0"/>
+          <a:chExt cx="0" cy="0"/>
+        </a:xfrm>
+      </p:grpSpPr>
+      <p:sp>
+        <p:nvSpPr>
+          <p:cNvPr id="2" name="Title 1">
+            <a:extLst>
+              <a:ext uri="{FF2B5EF4-FFF2-40B4-BE49-F238E27FC236}">
+                <a16:creationId xmlns:a16="http://schemas.microsoft.com/office/drawing/2014/main" id="{BEBDF715-EE08-4E72-A5AF-D38F7F94FD48}"/>
+              </a:ext>
+            </a:extLst>
+          </p:cNvPr>
+          <p:cNvSpPr>
+            <a:spLocks noGrp="1"/>
+          </p:cNvSpPr>
+          <p:nvPr>
+            <p:ph type="title"/>
+          </p:nvPr>
+        </p:nvSpPr>
+        <p:spPr>
+          <a:xfrm>
+            <a:off x="0" y="21546"/>
+            <a:ext cx="12192000" cy="1137435"/>
+          </a:xfrm>
+        </p:spPr>
+        <p:txBody>
+          <a:bodyPr/>
+          <a:lstStyle/>
+          <a:p>
+            <a:pPr algn="ctr"/>
+            <a:r>
+              <a:rPr lang="en-US" dirty="0"/>
+              <a:t>Comparing MATLAB TAWSS with Fluent Mean WSS</a:t>
+            </a:r>
+          </a:p>
+        </p:txBody>
+      </p:sp>
+      <p:pic>
+        <p:nvPicPr>
+          <p:cNvPr id="5" name="Picture 4">
+            <a:extLst>
+              <a:ext uri="{FF2B5EF4-FFF2-40B4-BE49-F238E27FC236}">
+                <a16:creationId xmlns:a16="http://schemas.microsoft.com/office/drawing/2014/main" id="{5257E772-1A64-4446-AAAD-88D0D3EB6F1D}"/>
+              </a:ext>
+            </a:extLst>
+          </p:cNvPr>
+          <p:cNvPicPr>
+            <a:picLocks noChangeAspect="1"/>
+          </p:cNvPicPr>
+          <p:nvPr/>
+        </p:nvPicPr>
+        <p:blipFill>
+          <a:blip r:embed="rId2">
+            <a:extLst>
+              <a:ext uri="{28A0092B-C50C-407E-A947-70E740481C1C}">
+                <a14:useLocalDpi xmlns:a14="http://schemas.microsoft.com/office/drawing/2010/main" val="0"/>
+              </a:ext>
+            </a:extLst>
+          </a:blip>
+          <a:srcRect/>
+          <a:stretch/>
+        </p:blipFill>
+        <p:spPr>
+          <a:xfrm>
+            <a:off x="838200" y="1904195"/>
+            <a:ext cx="9496425" cy="3829049"/>
+          </a:xfrm>
+          <a:prstGeom prst="rect">
+            <a:avLst/>
+          </a:prstGeom>
+        </p:spPr>
+      </p:pic>
+      <p:sp>
+        <p:nvSpPr>
+          <p:cNvPr id="6" name="Rectangle 5">
+            <a:extLst>
+              <a:ext uri="{FF2B5EF4-FFF2-40B4-BE49-F238E27FC236}">
+                <a16:creationId xmlns:a16="http://schemas.microsoft.com/office/drawing/2014/main" id="{880C5A1B-1E03-4CCE-8D4F-6B048FD0170E}"/>
+              </a:ext>
+            </a:extLst>
+          </p:cNvPr>
+          <p:cNvSpPr/>
+          <p:nvPr/>
+        </p:nvSpPr>
+        <p:spPr>
+          <a:xfrm>
+            <a:off x="2890244" y="1319420"/>
+            <a:ext cx="1574470" cy="584775"/>
+          </a:xfrm>
+          <a:prstGeom prst="rect">
+            <a:avLst/>
+          </a:prstGeom>
+          <a:noFill/>
+        </p:spPr>
+        <p:txBody>
+          <a:bodyPr wrap="none" lIns="91440" tIns="45720" rIns="91440" bIns="45720">
+            <a:spAutoFit/>
+          </a:bodyPr>
+          <a:lstStyle/>
+          <a:p>
+            <a:pPr algn="ctr"/>
+            <a:r>
+              <a:rPr lang="en-US" sz="3200" dirty="0">
+                <a:ln w="0"/>
+              </a:rPr>
+              <a:t>MATLAB</a:t>
+            </a:r>
+            <a:endParaRPr lang="en-US" sz="3200" b="0" cap="none" spc="0" dirty="0">
+              <a:ln w="0"/>
+              <a:solidFill>
+                <a:schemeClr val="tx1"/>
+              </a:solidFill>
+              <a:effectLst/>
+            </a:endParaRPr>
+          </a:p>
+        </p:txBody>
+      </p:sp>
+      <p:sp>
+        <p:nvSpPr>
+          <p:cNvPr id="7" name="Rectangle 6">
+            <a:extLst>
+              <a:ext uri="{FF2B5EF4-FFF2-40B4-BE49-F238E27FC236}">
+                <a16:creationId xmlns:a16="http://schemas.microsoft.com/office/drawing/2014/main" id="{F994F74A-4A54-42EA-9EF2-CB9B41257240}"/>
+              </a:ext>
+            </a:extLst>
+          </p:cNvPr>
+          <p:cNvSpPr/>
+          <p:nvPr/>
+        </p:nvSpPr>
+        <p:spPr>
+          <a:xfrm>
+            <a:off x="7895089" y="1398300"/>
+            <a:ext cx="1238865" cy="584775"/>
+          </a:xfrm>
+          <a:prstGeom prst="rect">
+            <a:avLst/>
+          </a:prstGeom>
+          <a:noFill/>
+        </p:spPr>
+        <p:txBody>
+          <a:bodyPr wrap="none" lIns="91440" tIns="45720" rIns="91440" bIns="45720">
+            <a:spAutoFit/>
+          </a:bodyPr>
+          <a:lstStyle/>
+          <a:p>
+            <a:pPr algn="ctr"/>
+            <a:r>
+              <a:rPr lang="en-US" sz="3200" dirty="0">
+                <a:ln w="0"/>
+              </a:rPr>
+              <a:t>Fluent</a:t>
+            </a:r>
+            <a:endParaRPr lang="en-US" sz="3200" b="0" cap="none" spc="0" dirty="0">
+              <a:ln w="0"/>
+              <a:solidFill>
+                <a:schemeClr val="tx1"/>
+              </a:solidFill>
+              <a:effectLst/>
+            </a:endParaRPr>
+          </a:p>
+        </p:txBody>
+      </p:sp>
+      <p:sp>
+        <p:nvSpPr>
+          <p:cNvPr id="8" name="Rectangle 7">
+            <a:extLst>
+              <a:ext uri="{FF2B5EF4-FFF2-40B4-BE49-F238E27FC236}">
+                <a16:creationId xmlns:a16="http://schemas.microsoft.com/office/drawing/2014/main" id="{EC3C6AD5-9D4C-4343-8646-1C053586E93B}"/>
+              </a:ext>
+            </a:extLst>
+          </p:cNvPr>
+          <p:cNvSpPr/>
+          <p:nvPr/>
+        </p:nvSpPr>
+        <p:spPr>
+          <a:xfrm>
+            <a:off x="4263870" y="5951740"/>
+            <a:ext cx="2645084" cy="584775"/>
+          </a:xfrm>
+          <a:prstGeom prst="rect">
+            <a:avLst/>
+          </a:prstGeom>
+          <a:noFill/>
+        </p:spPr>
+        <p:txBody>
+          <a:bodyPr wrap="none" lIns="91440" tIns="45720" rIns="91440" bIns="45720">
+            <a:spAutoFit/>
+          </a:bodyPr>
+          <a:lstStyle/>
+          <a:p>
+            <a:pPr algn="ctr"/>
+            <a:r>
+              <a:rPr lang="en-US" sz="3200" dirty="0">
+                <a:ln w="0"/>
+              </a:rPr>
+              <a:t>Error = 1.305%</a:t>
+            </a:r>
+            <a:endParaRPr lang="en-US" sz="3200" b="0" cap="none" spc="0" dirty="0">
+              <a:ln w="0"/>
+              <a:solidFill>
+                <a:schemeClr val="tx1"/>
+              </a:solidFill>
+              <a:effectLst/>
+            </a:endParaRPr>
+          </a:p>
+        </p:txBody>
+      </p:sp>
+    </p:spTree>
+    <p:extLst>
+      <p:ext uri="{BB962C8B-B14F-4D97-AF65-F5344CB8AC3E}">
+        <p14:creationId xmlns:p14="http://schemas.microsoft.com/office/powerpoint/2010/main" val="2521904486"/>
+      </p:ext>
+    </p:extLst>
+  </p:cSld>
+  <p:clrMapOvr>
+    <a:masterClrMapping/>
+  </p:clrMapOvr>
+</p:sld>
+</file>
+
 <file path=ppt/slides/slide2.xml><?xml version="1.0" encoding="utf-8"?>
 <p:sld xmlns:a="http://schemas.openxmlformats.org/drawingml/2006/main" xmlns:r="http://schemas.openxmlformats.org/officeDocument/2006/relationships" xmlns:p="http://schemas.openxmlformats.org/presentationml/2006/main">
   <p:cSld>
@@ -4353,8 +4588,8 @@
           </a:p>
         </p:txBody>
       </p:sp>
-      <mc:AlternateContent xmlns:mc="http://schemas.openxmlformats.org/markup-compatibility/2006">
-        <mc:Choice xmlns:a14="http://schemas.microsoft.com/office/drawing/2010/main" Requires="a14">
+      <mc:AlternateContent xmlns:mc="http://schemas.openxmlformats.org/markup-compatibility/2006" xmlns:a14="http://schemas.microsoft.com/office/drawing/2010/main">
+        <mc:Choice Requires="a14">
           <p:sp>
             <p:nvSpPr>
               <p:cNvPr id="4" name="TextBox 3">
@@ -4564,7 +4799,7 @@
             </p:txBody>
           </p:sp>
         </mc:Choice>
-        <mc:Fallback>
+        <mc:Fallback xmlns="">
           <p:sp>
             <p:nvSpPr>
               <p:cNvPr id="4" name="TextBox 3">
@@ -4609,8 +4844,8 @@
           </p:sp>
         </mc:Fallback>
       </mc:AlternateContent>
-      <mc:AlternateContent xmlns:mc="http://schemas.openxmlformats.org/markup-compatibility/2006">
-        <mc:Choice xmlns:a14="http://schemas.microsoft.com/office/drawing/2010/main" Requires="a14">
+      <mc:AlternateContent xmlns:mc="http://schemas.openxmlformats.org/markup-compatibility/2006" xmlns:a14="http://schemas.microsoft.com/office/drawing/2010/main">
+        <mc:Choice Requires="a14">
           <p:sp>
             <p:nvSpPr>
               <p:cNvPr id="5" name="TextBox 4">
@@ -4778,7 +5013,7 @@
             </p:txBody>
           </p:sp>
         </mc:Choice>
-        <mc:Fallback>
+        <mc:Fallback xmlns="">
           <p:sp>
             <p:nvSpPr>
               <p:cNvPr id="5" name="TextBox 4">
@@ -4823,8 +5058,8 @@
           </p:sp>
         </mc:Fallback>
       </mc:AlternateContent>
-      <mc:AlternateContent xmlns:mc="http://schemas.openxmlformats.org/markup-compatibility/2006">
-        <mc:Choice xmlns:a14="http://schemas.microsoft.com/office/drawing/2010/main" Requires="a14">
+      <mc:AlternateContent xmlns:mc="http://schemas.openxmlformats.org/markup-compatibility/2006" xmlns:a14="http://schemas.microsoft.com/office/drawing/2010/main">
+        <mc:Choice Requires="a14">
           <p:sp>
             <p:nvSpPr>
               <p:cNvPr id="11" name="TextBox 10">
@@ -5232,7 +5467,7 @@
             </p:txBody>
           </p:sp>
         </mc:Choice>
-        <mc:Fallback>
+        <mc:Fallback xmlns="">
           <p:sp>
             <p:nvSpPr>
               <p:cNvPr id="11" name="TextBox 10">
@@ -5277,8 +5512,8 @@
           </p:sp>
         </mc:Fallback>
       </mc:AlternateContent>
-      <mc:AlternateContent xmlns:mc="http://schemas.openxmlformats.org/markup-compatibility/2006">
-        <mc:Choice xmlns:a14="http://schemas.microsoft.com/office/drawing/2010/main" Requires="a14">
+      <mc:AlternateContent xmlns:mc="http://schemas.openxmlformats.org/markup-compatibility/2006" xmlns:a14="http://schemas.microsoft.com/office/drawing/2010/main">
+        <mc:Choice Requires="a14">
           <p:sp>
             <p:nvSpPr>
               <p:cNvPr id="12" name="TextBox 11">
@@ -5377,7 +5612,7 @@
             </p:txBody>
           </p:sp>
         </mc:Choice>
-        <mc:Fallback>
+        <mc:Fallback xmlns="">
           <p:sp>
             <p:nvSpPr>
               <p:cNvPr id="12" name="TextBox 11">
@@ -5680,7 +5915,7 @@
         </p:blipFill>
         <p:spPr>
           <a:xfrm>
-            <a:off x="334340" y="1962740"/>
+            <a:off x="334340" y="2350243"/>
             <a:ext cx="5761660" cy="3364169"/>
           </a:xfrm>
           <a:prstGeom prst="rect">
@@ -5804,7 +6039,7 @@
         </p:blipFill>
         <p:spPr>
           <a:xfrm>
-            <a:off x="6096000" y="1973763"/>
+            <a:off x="6096000" y="2350242"/>
             <a:ext cx="5969946" cy="3364169"/>
           </a:xfrm>
           <a:prstGeom prst="rect">

</xml_diff>